<commit_message>
Slide with promptbook engine
</commit_message>
<xml_diff>
--- a/Book-2.0.pptx
+++ b/Book-2.0.pptx
@@ -12,6 +12,7 @@
     <p:sldId id="260" r:id="rId7"/>
     <p:sldId id="261" r:id="rId8"/>
     <p:sldId id="262" r:id="rId9"/>
+    <p:sldId id="263" r:id="rId10"/>
   </p:sldIdLst>
   <p:sldSz cx="12192000" cy="6858000"/>
   <p:notesSz cx="7772400" cy="10058400"/>
@@ -12037,15 +12038,371 @@
           </a:p>
         </p:txBody>
       </p:sp>
-      <p:sp>
-        <p:nvSpPr>
-          <p:cNvPr id="183" name=""/>
+      <p:pic>
+        <p:nvPicPr>
+          <p:cNvPr id="183" name="" descr=""/>
+          <p:cNvPicPr/>
+          <p:nvPr/>
+        </p:nvPicPr>
+        <p:blipFill>
+          <a:blip r:embed="rId1"/>
+          <a:stretch/>
+        </p:blipFill>
+        <p:spPr>
+          <a:xfrm>
+            <a:off x="752400" y="3638520"/>
+            <a:ext cx="151920" cy="151920"/>
+          </a:xfrm>
+          <a:prstGeom prst="rect">
+            <a:avLst/>
+          </a:prstGeom>
+          <a:ln w="0">
+            <a:noFill/>
+          </a:ln>
+        </p:spPr>
+      </p:pic>
+      <p:sp>
+        <p:nvSpPr>
+          <p:cNvPr id="184" name=""/>
+          <p:cNvSpPr txBox="1"/>
+          <p:nvPr/>
+        </p:nvSpPr>
+        <p:spPr>
+          <a:xfrm>
+            <a:off x="747720" y="2780640"/>
+            <a:ext cx="4158360" cy="588600"/>
+          </a:xfrm>
+          <a:prstGeom prst="rect">
+            <a:avLst/>
+          </a:prstGeom>
+          <a:noFill/>
+          <a:ln w="0">
+            <a:noFill/>
+          </a:ln>
+        </p:spPr>
+        <p:txBody>
+          <a:bodyPr lIns="0" rIns="0" tIns="0" bIns="0" anchor="t">
+            <a:noAutofit/>
+          </a:bodyPr>
+          <a:p>
+            <a:r>
+              <a:rPr b="1" lang="en-US" sz="3480" spc="-1" strike="noStrike">
+                <a:solidFill>
+                  <a:srgbClr val="224466"/>
+                </a:solidFill>
+                <a:latin typeface="SegoeUI"/>
+                <a:ea typeface="SegoeUI"/>
+              </a:rPr>
+              <a:t>Promptbook Engine</a:t>
+            </a:r>
+            <a:endParaRPr b="0" lang="en-US" sz="3480" spc="-1" strike="noStrike">
+              <a:solidFill>
+                <a:srgbClr val="000000"/>
+              </a:solidFill>
+              <a:latin typeface="Times New Roman"/>
+            </a:endParaRPr>
+          </a:p>
+        </p:txBody>
+      </p:sp>
+      <p:sp>
+        <p:nvSpPr>
+          <p:cNvPr id="185" name=""/>
+          <p:cNvSpPr txBox="1"/>
+          <p:nvPr/>
+        </p:nvSpPr>
+        <p:spPr>
+          <a:xfrm>
+            <a:off x="900000" y="3654720"/>
+            <a:ext cx="2428560" cy="366480"/>
+          </a:xfrm>
+          <a:prstGeom prst="rect">
+            <a:avLst/>
+          </a:prstGeom>
+          <a:noFill/>
+          <a:ln w="0">
+            <a:noFill/>
+          </a:ln>
+        </p:spPr>
+        <p:txBody>
+          <a:bodyPr lIns="0" rIns="0" tIns="0" bIns="0" anchor="t">
+            <a:noAutofit/>
+          </a:bodyPr>
+          <a:p>
+            <a:r>
+              <a:rPr b="0" lang="en-US" sz="2170" spc="-1" strike="noStrike">
+                <a:solidFill>
+                  <a:srgbClr val="1f2328"/>
+                </a:solidFill>
+                <a:latin typeface="SegoeUI"/>
+                <a:ea typeface="SegoeUI"/>
+              </a:rPr>
+              <a:t>Promptbook Engine</a:t>
+            </a:r>
+            <a:endParaRPr b="0" lang="en-US" sz="2170" spc="-1" strike="noStrike">
+              <a:solidFill>
+                <a:srgbClr val="000000"/>
+              </a:solidFill>
+              <a:latin typeface="Times New Roman"/>
+            </a:endParaRPr>
+          </a:p>
+        </p:txBody>
+      </p:sp>
+      <p:sp>
+        <p:nvSpPr>
+          <p:cNvPr id="186" name=""/>
+          <p:cNvSpPr txBox="1"/>
+          <p:nvPr/>
+        </p:nvSpPr>
+        <p:spPr>
+          <a:xfrm>
+            <a:off x="11783160" y="6335280"/>
+            <a:ext cx="228240" cy="305280"/>
+          </a:xfrm>
+          <a:prstGeom prst="rect">
+            <a:avLst/>
+          </a:prstGeom>
+          <a:noFill/>
+          <a:ln w="0">
+            <a:noFill/>
+          </a:ln>
+        </p:spPr>
+        <p:txBody>
+          <a:bodyPr lIns="0" rIns="0" tIns="0" bIns="0" anchor="t">
+            <a:noAutofit/>
+          </a:bodyPr>
+          <a:p>
+            <a:r>
+              <a:rPr b="0" lang="en-US" sz="1800" spc="-1" strike="noStrike">
+                <a:solidFill>
+                  <a:srgbClr val="777777"/>
+                </a:solidFill>
+                <a:latin typeface="SegoeUI"/>
+                <a:ea typeface="SegoeUI"/>
+              </a:rPr>
+              <a:t>7</a:t>
+            </a:r>
+            <a:endParaRPr b="0" lang="en-US" sz="1800" spc="-1" strike="noStrike">
+              <a:solidFill>
+                <a:srgbClr val="000000"/>
+              </a:solidFill>
+              <a:latin typeface="Times New Roman"/>
+            </a:endParaRPr>
+          </a:p>
+        </p:txBody>
+      </p:sp>
+    </p:spTree>
+  </p:cSld>
+  <mc:AlternateContent>
+    <mc:Choice Requires="p14">
+      <p:transition spd="slow" p14:dur="2000"/>
+    </mc:Choice>
+    <mc:Fallback>
+      <p:transition spd="slow"/>
+    </mc:Fallback>
+  </mc:AlternateContent>
+</p:sld>
+</file>
+
+<file path=ppt/slides/slide8.xml><?xml version="1.0" encoding="utf-8"?>
+<p:sld xmlns:a="http://schemas.openxmlformats.org/drawingml/2006/main" xmlns:p="http://schemas.openxmlformats.org/presentationml/2006/main" xmlns:r="http://schemas.openxmlformats.org/officeDocument/2006/relationships" xmlns:p14="http://schemas.microsoft.com/office/powerpoint/2010/main" xmlns:p15="http://schemas.microsoft.com/office/powerpoint/2012/main" xmlns:mc="http://schemas.openxmlformats.org/markup-compatibility/2006">
+  <p:cSld>
+    <p:spTree>
+      <p:nvGrpSpPr>
+        <p:cNvPr id="1" name=""/>
+        <p:cNvGrpSpPr/>
+        <p:nvPr/>
+      </p:nvGrpSpPr>
+      <p:grpSpPr>
+        <a:xfrm>
+          <a:off x="0" y="0"/>
+          <a:ext cx="0" cy="0"/>
+          <a:chOff x="0" y="0"/>
+          <a:chExt cx="0" cy="0"/>
+        </a:xfrm>
+      </p:grpSpPr>
+      <p:sp>
+        <p:nvSpPr>
+          <p:cNvPr id="187" name=""/>
           <p:cNvSpPr/>
           <p:nvPr/>
         </p:nvSpPr>
         <p:spPr>
           <a:xfrm>
-            <a:off x="881640" y="1776600"/>
+            <a:off x="0" y="0"/>
+            <a:ext cx="12192120" cy="6858000"/>
+          </a:xfrm>
+          <a:custGeom>
+            <a:avLst/>
+            <a:gdLst/>
+            <a:ahLst/>
+            <a:rect l="0" t="0" r="r" b="b"/>
+            <a:pathLst>
+              <a:path w="33867" h="19050">
+                <a:moveTo>
+                  <a:pt x="0" y="0"/>
+                </a:moveTo>
+                <a:lnTo>
+                  <a:pt x="33867" y="0"/>
+                </a:lnTo>
+                <a:lnTo>
+                  <a:pt x="33867" y="19050"/>
+                </a:lnTo>
+                <a:lnTo>
+                  <a:pt x="0" y="19050"/>
+                </a:lnTo>
+                <a:lnTo>
+                  <a:pt x="0" y="0"/>
+                </a:lnTo>
+                <a:close/>
+              </a:path>
+            </a:pathLst>
+          </a:custGeom>
+          <a:solidFill>
+            <a:srgbClr val="ffffff"/>
+          </a:solidFill>
+          <a:ln w="0">
+            <a:noFill/>
+          </a:ln>
+        </p:spPr>
+        <p:txBody>
+          <a:bodyPr lIns="0" rIns="0" tIns="0" bIns="0" anchor="t">
+            <a:noAutofit/>
+          </a:bodyPr>
+          <a:p>
+            <a:endParaRPr b="0" lang="en-US" sz="2400" spc="-1" strike="noStrike">
+              <a:solidFill>
+                <a:srgbClr val="000000"/>
+              </a:solidFill>
+              <a:latin typeface="Times New Roman"/>
+            </a:endParaRPr>
+          </a:p>
+        </p:txBody>
+      </p:sp>
+      <p:sp>
+        <p:nvSpPr>
+          <p:cNvPr id="188" name=""/>
+          <p:cNvSpPr/>
+          <p:nvPr/>
+        </p:nvSpPr>
+        <p:spPr>
+          <a:xfrm>
+            <a:off x="0" y="0"/>
+            <a:ext cx="12192120" cy="6858000"/>
+          </a:xfrm>
+          <a:custGeom>
+            <a:avLst/>
+            <a:gdLst/>
+            <a:ahLst/>
+            <a:rect l="0" t="0" r="r" b="b"/>
+            <a:pathLst>
+              <a:path w="33867" h="19050">
+                <a:moveTo>
+                  <a:pt x="0" y="0"/>
+                </a:moveTo>
+                <a:lnTo>
+                  <a:pt x="33867" y="0"/>
+                </a:lnTo>
+                <a:lnTo>
+                  <a:pt x="33867" y="19050"/>
+                </a:lnTo>
+                <a:lnTo>
+                  <a:pt x="0" y="19050"/>
+                </a:lnTo>
+                <a:lnTo>
+                  <a:pt x="0" y="0"/>
+                </a:lnTo>
+                <a:close/>
+              </a:path>
+            </a:pathLst>
+          </a:custGeom>
+          <a:solidFill>
+            <a:srgbClr val="ffffff"/>
+          </a:solidFill>
+          <a:ln w="0">
+            <a:noFill/>
+          </a:ln>
+        </p:spPr>
+        <p:txBody>
+          <a:bodyPr lIns="0" rIns="0" tIns="0" bIns="0" anchor="t">
+            <a:noAutofit/>
+          </a:bodyPr>
+          <a:p>
+            <a:endParaRPr b="0" lang="en-US" sz="2400" spc="-1" strike="noStrike">
+              <a:solidFill>
+                <a:srgbClr val="000000"/>
+              </a:solidFill>
+              <a:latin typeface="Times New Roman"/>
+            </a:endParaRPr>
+          </a:p>
+        </p:txBody>
+      </p:sp>
+      <p:sp>
+        <p:nvSpPr>
+          <p:cNvPr id="189" name=""/>
+          <p:cNvSpPr/>
+          <p:nvPr/>
+        </p:nvSpPr>
+        <p:spPr>
+          <a:xfrm>
+            <a:off x="0" y="0"/>
+            <a:ext cx="12192120" cy="6858000"/>
+          </a:xfrm>
+          <a:custGeom>
+            <a:avLst/>
+            <a:gdLst/>
+            <a:ahLst/>
+            <a:rect l="0" t="0" r="r" b="b"/>
+            <a:pathLst>
+              <a:path w="33867" h="19050">
+                <a:moveTo>
+                  <a:pt x="0" y="0"/>
+                </a:moveTo>
+                <a:lnTo>
+                  <a:pt x="33867" y="0"/>
+                </a:lnTo>
+                <a:lnTo>
+                  <a:pt x="33867" y="19050"/>
+                </a:lnTo>
+                <a:lnTo>
+                  <a:pt x="0" y="19050"/>
+                </a:lnTo>
+                <a:lnTo>
+                  <a:pt x="0" y="0"/>
+                </a:lnTo>
+                <a:close/>
+              </a:path>
+            </a:pathLst>
+          </a:custGeom>
+          <a:solidFill>
+            <a:srgbClr val="ffffff"/>
+          </a:solidFill>
+          <a:ln w="0">
+            <a:noFill/>
+          </a:ln>
+        </p:spPr>
+        <p:txBody>
+          <a:bodyPr lIns="0" rIns="0" tIns="0" bIns="0" anchor="t">
+            <a:noAutofit/>
+          </a:bodyPr>
+          <a:p>
+            <a:endParaRPr b="0" lang="en-US" sz="2400" spc="-1" strike="noStrike">
+              <a:solidFill>
+                <a:srgbClr val="000000"/>
+              </a:solidFill>
+              <a:latin typeface="Times New Roman"/>
+            </a:endParaRPr>
+          </a:p>
+        </p:txBody>
+      </p:sp>
+      <p:sp>
+        <p:nvSpPr>
+          <p:cNvPr id="190" name=""/>
+          <p:cNvSpPr/>
+          <p:nvPr/>
+        </p:nvSpPr>
+        <p:spPr>
+          <a:xfrm>
+            <a:off x="881640" y="1081440"/>
             <a:ext cx="344520" cy="389880"/>
           </a:xfrm>
           <a:custGeom>
@@ -12056,10 +12413,10 @@
             <a:pathLst>
               <a:path w="957" h="1083">
                 <a:moveTo>
-                  <a:pt x="934" y="504"/>
+                  <a:pt x="934" y="503"/>
                 </a:moveTo>
                 <a:lnTo>
-                  <a:pt x="626" y="393"/>
+                  <a:pt x="626" y="392"/>
                 </a:lnTo>
                 <a:lnTo>
                   <a:pt x="511" y="24"/>
@@ -12075,23 +12432,23 @@
                   <a:pt x="445" y="24"/>
                 </a:cubicBezTo>
                 <a:lnTo>
-                  <a:pt x="330" y="393"/>
-                </a:lnTo>
-                <a:lnTo>
-                  <a:pt x="23" y="504"/>
-                </a:lnTo>
-                <a:cubicBezTo>
-                  <a:pt x="9" y="509"/>
+                  <a:pt x="330" y="392"/>
+                </a:lnTo>
+                <a:lnTo>
+                  <a:pt x="23" y="503"/>
+                </a:lnTo>
+                <a:cubicBezTo>
+                  <a:pt x="9" y="508"/>
                   <a:pt x="0" y="521"/>
-                  <a:pt x="0" y="536"/>
-                </a:cubicBezTo>
-                <a:cubicBezTo>
-                  <a:pt x="0" y="550"/>
+                  <a:pt x="0" y="535"/>
+                </a:cubicBezTo>
+                <a:cubicBezTo>
+                  <a:pt x="0" y="549"/>
                   <a:pt x="9" y="562"/>
                   <a:pt x="23" y="567"/>
                 </a:cubicBezTo>
                 <a:lnTo>
-                  <a:pt x="330" y="679"/>
+                  <a:pt x="330" y="678"/>
                 </a:lnTo>
                 <a:lnTo>
                   <a:pt x="445" y="1059"/>
@@ -12107,20 +12464,20 @@
                   <a:pt x="511" y="1059"/>
                 </a:cubicBezTo>
                 <a:lnTo>
-                  <a:pt x="626" y="679"/>
+                  <a:pt x="626" y="678"/>
                 </a:lnTo>
                 <a:lnTo>
                   <a:pt x="934" y="567"/>
                 </a:lnTo>
                 <a:cubicBezTo>
                   <a:pt x="948" y="562"/>
-                  <a:pt x="957" y="550"/>
-                  <a:pt x="957" y="536"/>
-                </a:cubicBezTo>
-                <a:cubicBezTo>
-                  <a:pt x="957" y="522"/>
-                  <a:pt x="948" y="509"/>
-                  <a:pt x="934" y="504"/>
+                  <a:pt x="957" y="549"/>
+                  <a:pt x="957" y="535"/>
+                </a:cubicBezTo>
+                <a:cubicBezTo>
+                  <a:pt x="957" y="521"/>
+                  <a:pt x="948" y="508"/>
+                  <a:pt x="934" y="503"/>
                 </a:cubicBezTo>
                 <a:close/>
               </a:path>
@@ -12149,14 +12506,14 @@
       </p:sp>
       <p:sp>
         <p:nvSpPr>
-          <p:cNvPr id="184" name=""/>
+          <p:cNvPr id="191" name=""/>
           <p:cNvSpPr/>
           <p:nvPr/>
         </p:nvSpPr>
         <p:spPr>
           <a:xfrm>
-            <a:off x="802800" y="1780920"/>
-            <a:ext cx="174600" cy="397800"/>
+            <a:off x="802800" y="1085400"/>
+            <a:ext cx="174600" cy="398160"/>
           </a:xfrm>
           <a:custGeom>
             <a:avLst/>
@@ -12164,71 +12521,71 @@
             <a:ahLst/>
             <a:rect l="0" t="0" r="r" b="b"/>
             <a:pathLst>
-              <a:path w="485" h="1105">
+              <a:path w="485" h="1106">
                 <a:moveTo>
                   <a:pt x="462" y="865"/>
                 </a:moveTo>
                 <a:lnTo>
-                  <a:pt x="381" y="836"/>
+                  <a:pt x="381" y="835"/>
                 </a:lnTo>
                 <a:lnTo>
                   <a:pt x="350" y="724"/>
                 </a:lnTo>
                 <a:cubicBezTo>
-                  <a:pt x="346" y="710"/>
+                  <a:pt x="346" y="709"/>
                   <a:pt x="332" y="699"/>
                   <a:pt x="317" y="699"/>
                 </a:cubicBezTo>
                 <a:cubicBezTo>
                   <a:pt x="301" y="699"/>
-                  <a:pt x="288" y="710"/>
+                  <a:pt x="288" y="709"/>
                   <a:pt x="283" y="724"/>
                 </a:cubicBezTo>
                 <a:lnTo>
-                  <a:pt x="252" y="836"/>
+                  <a:pt x="252" y="835"/>
                 </a:lnTo>
                 <a:lnTo>
                   <a:pt x="172" y="865"/>
                 </a:lnTo>
                 <a:cubicBezTo>
                   <a:pt x="159" y="870"/>
-                  <a:pt x="150" y="882"/>
+                  <a:pt x="150" y="883"/>
                   <a:pt x="150" y="897"/>
                 </a:cubicBezTo>
                 <a:cubicBezTo>
                   <a:pt x="150" y="911"/>
-                  <a:pt x="159" y="923"/>
-                  <a:pt x="172" y="928"/>
-                </a:cubicBezTo>
-                <a:lnTo>
-                  <a:pt x="252" y="957"/>
+                  <a:pt x="159" y="924"/>
+                  <a:pt x="172" y="929"/>
+                </a:cubicBezTo>
+                <a:lnTo>
+                  <a:pt x="252" y="958"/>
                 </a:lnTo>
                 <a:lnTo>
                   <a:pt x="283" y="1080"/>
                 </a:lnTo>
                 <a:cubicBezTo>
                   <a:pt x="287" y="1095"/>
-                  <a:pt x="301" y="1105"/>
-                  <a:pt x="317" y="1105"/>
-                </a:cubicBezTo>
-                <a:cubicBezTo>
-                  <a:pt x="333" y="1105"/>
+                  <a:pt x="301" y="1106"/>
+                  <a:pt x="317" y="1106"/>
+                </a:cubicBezTo>
+                <a:cubicBezTo>
+                  <a:pt x="333" y="1106"/>
                   <a:pt x="346" y="1095"/>
                   <a:pt x="350" y="1080"/>
                 </a:cubicBezTo>
                 <a:lnTo>
-                  <a:pt x="382" y="957"/>
-                </a:lnTo>
-                <a:lnTo>
-                  <a:pt x="462" y="928"/>
-                </a:lnTo>
-                <a:cubicBezTo>
-                  <a:pt x="476" y="923"/>
+                  <a:pt x="382" y="958"/>
+                </a:lnTo>
+                <a:lnTo>
+                  <a:pt x="462" y="929"/>
+                </a:lnTo>
+                <a:cubicBezTo>
+                  <a:pt x="476" y="924"/>
                   <a:pt x="485" y="911"/>
                   <a:pt x="485" y="897"/>
                 </a:cubicBezTo>
                 <a:cubicBezTo>
-                  <a:pt x="485" y="882"/>
+                  <a:pt x="485" y="883"/>
                   <a:pt x="476" y="870"/>
                   <a:pt x="462" y="865"/>
                 </a:cubicBezTo>
@@ -12236,10 +12593,10 @@
                   <a:pt x="311" y="132"/>
                 </a:moveTo>
                 <a:lnTo>
-                  <a:pt x="230" y="103"/>
-                </a:lnTo>
-                <a:lnTo>
-                  <a:pt x="199" y="23"/>
+                  <a:pt x="230" y="102"/>
+                </a:lnTo>
+                <a:lnTo>
+                  <a:pt x="199" y="22"/>
                 </a:lnTo>
                 <a:cubicBezTo>
                   <a:pt x="194" y="9"/>
@@ -12249,10 +12606,10 @@
                 <a:cubicBezTo>
                   <a:pt x="153" y="0"/>
                   <a:pt x="140" y="9"/>
-                  <a:pt x="135" y="23"/>
-                </a:cubicBezTo>
-                <a:lnTo>
-                  <a:pt x="104" y="103"/>
+                  <a:pt x="135" y="22"/>
+                </a:cubicBezTo>
+                <a:lnTo>
+                  <a:pt x="104" y="102"/>
                 </a:lnTo>
                 <a:lnTo>
                   <a:pt x="23" y="132"/>
@@ -12265,7 +12622,7 @@
                 <a:cubicBezTo>
                   <a:pt x="0" y="178"/>
                   <a:pt x="9" y="191"/>
-                  <a:pt x="23" y="196"/>
+                  <a:pt x="23" y="195"/>
                 </a:cubicBezTo>
                 <a:lnTo>
                   <a:pt x="104" y="225"/>
@@ -12274,20 +12631,20 @@
                   <a:pt x="135" y="305"/>
                 </a:lnTo>
                 <a:cubicBezTo>
-                  <a:pt x="140" y="319"/>
-                  <a:pt x="153" y="328"/>
-                  <a:pt x="167" y="328"/>
-                </a:cubicBezTo>
-                <a:cubicBezTo>
-                  <a:pt x="181" y="328"/>
-                  <a:pt x="194" y="319"/>
+                  <a:pt x="140" y="318"/>
+                  <a:pt x="153" y="327"/>
+                  <a:pt x="167" y="327"/>
+                </a:cubicBezTo>
+                <a:cubicBezTo>
+                  <a:pt x="181" y="327"/>
+                  <a:pt x="194" y="318"/>
                   <a:pt x="199" y="305"/>
                 </a:cubicBezTo>
                 <a:lnTo>
                   <a:pt x="230" y="225"/>
                 </a:lnTo>
                 <a:lnTo>
-                  <a:pt x="311" y="196"/>
+                  <a:pt x="311" y="195"/>
                 </a:lnTo>
                 <a:cubicBezTo>
                   <a:pt x="325" y="191"/>
@@ -12326,13 +12683,13 @@
       </p:sp>
       <p:sp>
         <p:nvSpPr>
-          <p:cNvPr id="185" name=""/>
+          <p:cNvPr id="192" name=""/>
           <p:cNvSpPr txBox="1"/>
           <p:nvPr/>
         </p:nvSpPr>
         <p:spPr>
           <a:xfrm>
-            <a:off x="1255680" y="1675800"/>
+            <a:off x="1255680" y="970920"/>
             <a:ext cx="2908800" cy="588600"/>
           </a:xfrm>
           <a:prstGeom prst="rect">
@@ -12379,14 +12736,14 @@
       </p:sp>
       <p:sp>
         <p:nvSpPr>
-          <p:cNvPr id="186" name=""/>
+          <p:cNvPr id="193" name=""/>
           <p:cNvSpPr txBox="1"/>
           <p:nvPr/>
         </p:nvSpPr>
         <p:spPr>
           <a:xfrm>
-            <a:off x="747720" y="2540520"/>
-            <a:ext cx="1070640" cy="366480"/>
+            <a:off x="747720" y="1845000"/>
+            <a:ext cx="1641960" cy="366480"/>
           </a:xfrm>
           <a:prstGeom prst="rect">
             <a:avLst/>
@@ -12409,7 +12766,7 @@
                 <a:latin typeface="SegoeUI"/>
                 <a:ea typeface="SegoeUI"/>
               </a:rPr>
-              <a:t>Jiří Jahn</a:t>
+              <a:t>Promptbook</a:t>
             </a:r>
             <a:endParaRPr b="0" lang="en-US" sz="2170" spc="-1" strike="noStrike">
               <a:solidFill>
@@ -12422,14 +12779,14 @@
       </p:sp>
       <p:sp>
         <p:nvSpPr>
-          <p:cNvPr id="187" name=""/>
+          <p:cNvPr id="194" name=""/>
           <p:cNvSpPr txBox="1"/>
           <p:nvPr/>
         </p:nvSpPr>
         <p:spPr>
           <a:xfrm>
-            <a:off x="747720" y="2959560"/>
-            <a:ext cx="1402920" cy="366480"/>
+            <a:off x="747720" y="2264040"/>
+            <a:ext cx="842040" cy="366480"/>
           </a:xfrm>
           <a:prstGeom prst="rect">
             <a:avLst/>
@@ -12447,12 +12804,12 @@
             <a:r>
               <a:rPr b="0" lang="en-US" sz="2170" spc="-1" strike="noStrike">
                 <a:solidFill>
-                  <a:srgbClr val="0969da"/>
+                  <a:srgbClr val="1f2328"/>
                 </a:solidFill>
                 <a:latin typeface="SegoeUI"/>
                 <a:ea typeface="SegoeUI"/>
               </a:rPr>
-              <a:t>jiri@ptbk.io</a:t>
+              <a:t>ptbk.io</a:t>
             </a:r>
             <a:endParaRPr b="0" lang="en-US" sz="2170" spc="-1" strike="noStrike">
               <a:solidFill>
@@ -12465,14 +12822,14 @@
       </p:sp>
       <p:sp>
         <p:nvSpPr>
-          <p:cNvPr id="188" name=""/>
+          <p:cNvPr id="195" name=""/>
           <p:cNvSpPr txBox="1"/>
           <p:nvPr/>
         </p:nvSpPr>
         <p:spPr>
           <a:xfrm>
-            <a:off x="747720" y="3369240"/>
-            <a:ext cx="2210400" cy="366480"/>
+            <a:off x="747720" y="2673720"/>
+            <a:ext cx="4476600" cy="366480"/>
           </a:xfrm>
           <a:prstGeom prst="rect">
             <a:avLst/>
@@ -12490,12 +12847,12 @@
             <a:r>
               <a:rPr b="0" lang="en-US" sz="2170" spc="-1" strike="noStrike">
                 <a:solidFill>
-                  <a:srgbClr val="0969da"/>
+                  <a:srgbClr val="1f2328"/>
                 </a:solidFill>
                 <a:latin typeface="SegoeUI"/>
                 <a:ea typeface="SegoeUI"/>
               </a:rPr>
-              <a:t>+420 777 090 067</a:t>
+              <a:t>github.com/webgptorg/promptbook</a:t>
             </a:r>
             <a:endParaRPr b="0" lang="en-US" sz="2170" spc="-1" strike="noStrike">
               <a:solidFill>
@@ -12508,14 +12865,14 @@
       </p:sp>
       <p:sp>
         <p:nvSpPr>
-          <p:cNvPr id="189" name=""/>
+          <p:cNvPr id="196" name=""/>
           <p:cNvSpPr txBox="1"/>
           <p:nvPr/>
         </p:nvSpPr>
         <p:spPr>
           <a:xfrm>
-            <a:off x="747720" y="3940560"/>
-            <a:ext cx="1544400" cy="366480"/>
+            <a:off x="747720" y="3245400"/>
+            <a:ext cx="1070640" cy="366480"/>
           </a:xfrm>
           <a:prstGeom prst="rect">
             <a:avLst/>
@@ -12538,7 +12895,7 @@
                 <a:latin typeface="SegoeUI"/>
                 <a:ea typeface="SegoeUI"/>
               </a:rPr>
-              <a:t>Pavol Hejný</a:t>
+              <a:t>Jiří Jahn</a:t>
             </a:r>
             <a:endParaRPr b="0" lang="en-US" sz="2170" spc="-1" strike="noStrike">
               <a:solidFill>
@@ -12551,14 +12908,14 @@
       </p:sp>
       <p:sp>
         <p:nvSpPr>
-          <p:cNvPr id="190" name=""/>
+          <p:cNvPr id="197" name=""/>
           <p:cNvSpPr txBox="1"/>
           <p:nvPr/>
         </p:nvSpPr>
         <p:spPr>
           <a:xfrm>
-            <a:off x="747720" y="4350240"/>
-            <a:ext cx="1768680" cy="366480"/>
+            <a:off x="747720" y="3654720"/>
+            <a:ext cx="1402920" cy="366480"/>
           </a:xfrm>
           <a:prstGeom prst="rect">
             <a:avLst/>
@@ -12581,7 +12938,7 @@
                 <a:latin typeface="SegoeUI"/>
                 <a:ea typeface="SegoeUI"/>
               </a:rPr>
-              <a:t>pavol@ptbk.io</a:t>
+              <a:t>jiri@ptbk.io</a:t>
             </a:r>
             <a:endParaRPr b="0" lang="en-US" sz="2170" spc="-1" strike="noStrike">
               <a:solidFill>
@@ -12594,13 +12951,13 @@
       </p:sp>
       <p:sp>
         <p:nvSpPr>
-          <p:cNvPr id="191" name=""/>
+          <p:cNvPr id="198" name=""/>
           <p:cNvSpPr txBox="1"/>
           <p:nvPr/>
         </p:nvSpPr>
         <p:spPr>
           <a:xfrm>
-            <a:off x="747720" y="4769280"/>
+            <a:off x="747720" y="4073760"/>
             <a:ext cx="2210400" cy="366480"/>
           </a:xfrm>
           <a:prstGeom prst="rect">
@@ -12624,6 +12981,135 @@
                 <a:latin typeface="SegoeUI"/>
                 <a:ea typeface="SegoeUI"/>
               </a:rPr>
+              <a:t>+420 777 090 067</a:t>
+            </a:r>
+            <a:endParaRPr b="0" lang="en-US" sz="2170" spc="-1" strike="noStrike">
+              <a:solidFill>
+                <a:srgbClr val="000000"/>
+              </a:solidFill>
+              <a:latin typeface="Times New Roman"/>
+            </a:endParaRPr>
+          </a:p>
+        </p:txBody>
+      </p:sp>
+      <p:sp>
+        <p:nvSpPr>
+          <p:cNvPr id="199" name=""/>
+          <p:cNvSpPr txBox="1"/>
+          <p:nvPr/>
+        </p:nvSpPr>
+        <p:spPr>
+          <a:xfrm>
+            <a:off x="747720" y="4636080"/>
+            <a:ext cx="1544400" cy="366480"/>
+          </a:xfrm>
+          <a:prstGeom prst="rect">
+            <a:avLst/>
+          </a:prstGeom>
+          <a:noFill/>
+          <a:ln w="0">
+            <a:noFill/>
+          </a:ln>
+        </p:spPr>
+        <p:txBody>
+          <a:bodyPr lIns="0" rIns="0" tIns="0" bIns="0" anchor="t">
+            <a:noAutofit/>
+          </a:bodyPr>
+          <a:p>
+            <a:r>
+              <a:rPr b="1" lang="en-US" sz="2170" spc="-1" strike="noStrike">
+                <a:solidFill>
+                  <a:srgbClr val="1f2328"/>
+                </a:solidFill>
+                <a:latin typeface="SegoeUI"/>
+                <a:ea typeface="SegoeUI"/>
+              </a:rPr>
+              <a:t>Pavol Hejný</a:t>
+            </a:r>
+            <a:endParaRPr b="0" lang="en-US" sz="2170" spc="-1" strike="noStrike">
+              <a:solidFill>
+                <a:srgbClr val="000000"/>
+              </a:solidFill>
+              <a:latin typeface="Times New Roman"/>
+            </a:endParaRPr>
+          </a:p>
+        </p:txBody>
+      </p:sp>
+      <p:sp>
+        <p:nvSpPr>
+          <p:cNvPr id="200" name=""/>
+          <p:cNvSpPr txBox="1"/>
+          <p:nvPr/>
+        </p:nvSpPr>
+        <p:spPr>
+          <a:xfrm>
+            <a:off x="747720" y="5055120"/>
+            <a:ext cx="1768680" cy="366480"/>
+          </a:xfrm>
+          <a:prstGeom prst="rect">
+            <a:avLst/>
+          </a:prstGeom>
+          <a:noFill/>
+          <a:ln w="0">
+            <a:noFill/>
+          </a:ln>
+        </p:spPr>
+        <p:txBody>
+          <a:bodyPr lIns="0" rIns="0" tIns="0" bIns="0" anchor="t">
+            <a:noAutofit/>
+          </a:bodyPr>
+          <a:p>
+            <a:r>
+              <a:rPr b="0" lang="en-US" sz="2170" spc="-1" strike="noStrike">
+                <a:solidFill>
+                  <a:srgbClr val="0969da"/>
+                </a:solidFill>
+                <a:latin typeface="SegoeUI"/>
+                <a:ea typeface="SegoeUI"/>
+              </a:rPr>
+              <a:t>pavol@ptbk.io</a:t>
+            </a:r>
+            <a:endParaRPr b="0" lang="en-US" sz="2170" spc="-1" strike="noStrike">
+              <a:solidFill>
+                <a:srgbClr val="000000"/>
+              </a:solidFill>
+              <a:latin typeface="Times New Roman"/>
+            </a:endParaRPr>
+          </a:p>
+        </p:txBody>
+      </p:sp>
+      <p:sp>
+        <p:nvSpPr>
+          <p:cNvPr id="201" name=""/>
+          <p:cNvSpPr txBox="1"/>
+          <p:nvPr/>
+        </p:nvSpPr>
+        <p:spPr>
+          <a:xfrm>
+            <a:off x="747720" y="5464440"/>
+            <a:ext cx="2210400" cy="366480"/>
+          </a:xfrm>
+          <a:prstGeom prst="rect">
+            <a:avLst/>
+          </a:prstGeom>
+          <a:noFill/>
+          <a:ln w="0">
+            <a:noFill/>
+          </a:ln>
+        </p:spPr>
+        <p:txBody>
+          <a:bodyPr lIns="0" rIns="0" tIns="0" bIns="0" anchor="t">
+            <a:noAutofit/>
+          </a:bodyPr>
+          <a:p>
+            <a:r>
+              <a:rPr b="0" lang="en-US" sz="2170" spc="-1" strike="noStrike">
+                <a:solidFill>
+                  <a:srgbClr val="0969da"/>
+                </a:solidFill>
+                <a:latin typeface="SegoeUI"/>
+                <a:ea typeface="SegoeUI"/>
+              </a:rPr>
               <a:t>+420 777 759 767</a:t>
             </a:r>
             <a:endParaRPr b="0" lang="en-US" sz="2170" spc="-1" strike="noStrike">
@@ -12637,7 +13123,7 @@
       </p:sp>
       <p:sp>
         <p:nvSpPr>
-          <p:cNvPr id="192" name=""/>
+          <p:cNvPr id="202" name=""/>
           <p:cNvSpPr txBox="1"/>
           <p:nvPr/>
         </p:nvSpPr>
@@ -12667,7 +13153,7 @@
                 <a:latin typeface="SegoeUI"/>
                 <a:ea typeface="SegoeUI"/>
               </a:rPr>
-              <a:t>7</a:t>
+              <a:t>8</a:t>
             </a:r>
             <a:endParaRPr b="0" lang="en-US" sz="1800" spc="-1" strike="noStrike">
               <a:solidFill>

</xml_diff>